<commit_message>
Update: mappings and global schema
Signed-off-by: Alessio Papi <alessio.papi@live.it>
</commit_message>
<xml_diff>
--- a/proposals/ER diagram.pptx
+++ b/proposals/ER diagram.pptx
@@ -5,28 +5,33 @@
     <p:sldMasterId id="2147483659" r:id="rId1"/>
   </p:sldMasterIdLst>
   <p:notesMasterIdLst>
-    <p:notesMasterId r:id="rId6"/>
+    <p:notesMasterId r:id="rId7"/>
   </p:notesMasterIdLst>
   <p:sldIdLst>
     <p:sldId id="256" r:id="rId2"/>
     <p:sldId id="260" r:id="rId3"/>
     <p:sldId id="262" r:id="rId4"/>
     <p:sldId id="257" r:id="rId5"/>
+    <p:sldId id="263" r:id="rId6"/>
   </p:sldIdLst>
   <p:sldSz cx="9144000" cy="5143500" type="screen16x9"/>
   <p:notesSz cx="6858000" cy="9144000"/>
   <p:embeddedFontLst>
     <p:embeddedFont>
+      <p:font typeface="Cambria Math" panose="02040503050406030204" pitchFamily="18" charset="0"/>
+      <p:regular r:id="rId8"/>
+    </p:embeddedFont>
+    <p:embeddedFont>
       <p:font typeface="Comfortaa" panose="020B0604020202020204" charset="0"/>
-      <p:regular r:id="rId7"/>
-      <p:bold r:id="rId8"/>
+      <p:regular r:id="rId9"/>
+      <p:bold r:id="rId10"/>
     </p:embeddedFont>
     <p:embeddedFont>
       <p:font typeface="Proxima Nova" panose="020B0604020202020204" charset="0"/>
-      <p:regular r:id="rId9"/>
-      <p:bold r:id="rId10"/>
-      <p:italic r:id="rId11"/>
-      <p:boldItalic r:id="rId12"/>
+      <p:regular r:id="rId11"/>
+      <p:bold r:id="rId12"/>
+      <p:italic r:id="rId13"/>
+      <p:boldItalic r:id="rId14"/>
     </p:embeddedFont>
   </p:embeddedFontLst>
   <p:defaultTextStyle>
@@ -1149,6 +1154,115 @@
 </p:notes>
 </file>
 
+<file path=ppt/notesSlides/notesSlide5.xml><?xml version="1.0" encoding="utf-8"?>
+<p:notes xmlns:a="http://schemas.openxmlformats.org/drawingml/2006/main" xmlns:r="http://schemas.openxmlformats.org/officeDocument/2006/relationships" xmlns:p="http://schemas.openxmlformats.org/presentationml/2006/main" showMasterSp="0" showMasterPhAnim="0">
+  <p:cSld>
+    <p:spTree>
+      <p:nvGrpSpPr>
+        <p:cNvPr id="1" name="Shape 166"/>
+        <p:cNvGrpSpPr/>
+        <p:nvPr/>
+      </p:nvGrpSpPr>
+      <p:grpSpPr>
+        <a:xfrm>
+          <a:off x="0" y="0"/>
+          <a:ext cx="0" cy="0"/>
+          <a:chOff x="0" y="0"/>
+          <a:chExt cx="0" cy="0"/>
+        </a:xfrm>
+      </p:grpSpPr>
+      <p:sp>
+        <p:nvSpPr>
+          <p:cNvPr id="167" name="Google Shape;167;gda48d4df38_0_14:notes"/>
+          <p:cNvSpPr>
+            <a:spLocks noGrp="1" noRot="1" noChangeAspect="1"/>
+          </p:cNvSpPr>
+          <p:nvPr>
+            <p:ph type="sldImg" idx="2"/>
+          </p:nvPr>
+        </p:nvSpPr>
+        <p:spPr>
+          <a:xfrm>
+            <a:off x="381000" y="685800"/>
+            <a:ext cx="6096000" cy="3429000"/>
+          </a:xfrm>
+          <a:custGeom>
+            <a:avLst/>
+            <a:gdLst/>
+            <a:ahLst/>
+            <a:cxnLst/>
+            <a:rect l="l" t="t" r="r" b="b"/>
+            <a:pathLst>
+              <a:path w="120000" h="120000" extrusionOk="0">
+                <a:moveTo>
+                  <a:pt x="0" y="0"/>
+                </a:moveTo>
+                <a:lnTo>
+                  <a:pt x="120000" y="0"/>
+                </a:lnTo>
+                <a:lnTo>
+                  <a:pt x="120000" y="120000"/>
+                </a:lnTo>
+                <a:lnTo>
+                  <a:pt x="0" y="120000"/>
+                </a:lnTo>
+                <a:close/>
+              </a:path>
+            </a:pathLst>
+          </a:custGeom>
+        </p:spPr>
+      </p:sp>
+      <p:sp>
+        <p:nvSpPr>
+          <p:cNvPr id="168" name="Google Shape;168;gda48d4df38_0_14:notes"/>
+          <p:cNvSpPr txBox="1">
+            <a:spLocks noGrp="1"/>
+          </p:cNvSpPr>
+          <p:nvPr>
+            <p:ph type="body" idx="1"/>
+          </p:nvPr>
+        </p:nvSpPr>
+        <p:spPr>
+          <a:xfrm>
+            <a:off x="685800" y="4343400"/>
+            <a:ext cx="5486400" cy="4114800"/>
+          </a:xfrm>
+          <a:prstGeom prst="rect">
+            <a:avLst/>
+          </a:prstGeom>
+        </p:spPr>
+        <p:txBody>
+          <a:bodyPr spcFirstLastPara="1" wrap="square" lIns="91425" tIns="91425" rIns="91425" bIns="91425" anchor="t" anchorCtr="0">
+            <a:noAutofit/>
+          </a:bodyPr>
+          <a:lstStyle/>
+          <a:p>
+            <a:pPr marL="0" lvl="0" indent="0" algn="l" rtl="0">
+              <a:spcBef>
+                <a:spcPts val="0"/>
+              </a:spcBef>
+              <a:spcAft>
+                <a:spcPts val="0"/>
+              </a:spcAft>
+              <a:buNone/>
+            </a:pPr>
+            <a:endParaRPr/>
+          </a:p>
+        </p:txBody>
+      </p:sp>
+    </p:spTree>
+    <p:extLst>
+      <p:ext uri="{BB962C8B-B14F-4D97-AF65-F5344CB8AC3E}">
+        <p14:creationId xmlns:p14="http://schemas.microsoft.com/office/powerpoint/2010/main" val="2513229845"/>
+      </p:ext>
+    </p:extLst>
+  </p:cSld>
+  <p:clrMapOvr>
+    <a:masterClrMapping/>
+  </p:clrMapOvr>
+</p:notes>
+</file>
+
 <file path=ppt/slideLayouts/slideLayout1.xml><?xml version="1.0" encoding="utf-8"?>
 <p:sldLayout xmlns:a="http://schemas.openxmlformats.org/drawingml/2006/main" xmlns:r="http://schemas.openxmlformats.org/officeDocument/2006/relationships" xmlns:p="http://schemas.openxmlformats.org/presentationml/2006/main" matchingName="Title slide" type="title">
   <p:cSld name="TITLE">
@@ -1524,7 +1638,7 @@
             </a:pPr>
             <a:fld id="{00000000-1234-1234-1234-123412341234}" type="slidenum">
               <a:rPr lang="it"/>
-              <a:t>‹N›</a:t>
+              <a:t>‹#›</a:t>
             </a:fld>
             <a:endParaRPr/>
           </a:p>
@@ -1888,7 +2002,7 @@
             </a:pPr>
             <a:fld id="{00000000-1234-1234-1234-123412341234}" type="slidenum">
               <a:rPr lang="it"/>
-              <a:t>‹N›</a:t>
+              <a:t>‹#›</a:t>
             </a:fld>
             <a:endParaRPr/>
           </a:p>
@@ -1992,7 +2106,7 @@
             </a:pPr>
             <a:fld id="{00000000-1234-1234-1234-123412341234}" type="slidenum">
               <a:rPr lang="it"/>
-              <a:t>‹N›</a:t>
+              <a:t>‹#›</a:t>
             </a:fld>
             <a:endParaRPr/>
           </a:p>
@@ -2225,7 +2339,7 @@
             </a:pPr>
             <a:fld id="{00000000-1234-1234-1234-123412341234}" type="slidenum">
               <a:rPr lang="it"/>
-              <a:t>‹N›</a:t>
+              <a:t>‹#›</a:t>
             </a:fld>
             <a:endParaRPr/>
           </a:p>
@@ -2587,7 +2701,7 @@
             </a:pPr>
             <a:fld id="{00000000-1234-1234-1234-123412341234}" type="slidenum">
               <a:rPr lang="it"/>
-              <a:t>‹N›</a:t>
+              <a:t>‹#›</a:t>
             </a:fld>
             <a:endParaRPr/>
           </a:p>
@@ -3078,7 +3192,7 @@
             </a:pPr>
             <a:fld id="{00000000-1234-1234-1234-123412341234}" type="slidenum">
               <a:rPr lang="it"/>
-              <a:t>‹N›</a:t>
+              <a:t>‹#›</a:t>
             </a:fld>
             <a:endParaRPr/>
           </a:p>
@@ -3311,7 +3425,7 @@
             </a:pPr>
             <a:fld id="{00000000-1234-1234-1234-123412341234}" type="slidenum">
               <a:rPr lang="it"/>
-              <a:t>‹N›</a:t>
+              <a:t>‹#›</a:t>
             </a:fld>
             <a:endParaRPr/>
           </a:p>
@@ -3673,7 +3787,7 @@
             </a:pPr>
             <a:fld id="{00000000-1234-1234-1234-123412341234}" type="slidenum">
               <a:rPr lang="it"/>
-              <a:t>‹N›</a:t>
+              <a:t>‹#›</a:t>
             </a:fld>
             <a:endParaRPr/>
           </a:p>
@@ -3906,7 +4020,7 @@
             </a:pPr>
             <a:fld id="{00000000-1234-1234-1234-123412341234}" type="slidenum">
               <a:rPr lang="it"/>
-              <a:t>‹N›</a:t>
+              <a:t>‹#›</a:t>
             </a:fld>
             <a:endParaRPr/>
           </a:p>
@@ -4464,7 +4578,7 @@
             </a:pPr>
             <a:fld id="{00000000-1234-1234-1234-123412341234}" type="slidenum">
               <a:rPr lang="it"/>
-              <a:t>‹N›</a:t>
+              <a:t>‹#›</a:t>
             </a:fld>
             <a:endParaRPr/>
           </a:p>
@@ -4612,7 +4726,7 @@
             </a:pPr>
             <a:fld id="{00000000-1234-1234-1234-123412341234}" type="slidenum">
               <a:rPr lang="it"/>
-              <a:t>‹N›</a:t>
+              <a:t>‹#›</a:t>
             </a:fld>
             <a:endParaRPr/>
           </a:p>
@@ -5183,7 +5297,7 @@
             </a:pPr>
             <a:fld id="{00000000-1234-1234-1234-123412341234}" type="slidenum">
               <a:rPr lang="it"/>
-              <a:t>‹N›</a:t>
+              <a:t>‹#›</a:t>
             </a:fld>
             <a:endParaRPr/>
           </a:p>
@@ -16399,6 +16513,1862 @@
 </p:sld>
 </file>
 
+<file path=ppt/slides/slide5.xml><?xml version="1.0" encoding="utf-8"?>
+<p:sld xmlns:a="http://schemas.openxmlformats.org/drawingml/2006/main" xmlns:r="http://schemas.openxmlformats.org/officeDocument/2006/relationships" xmlns:p="http://schemas.openxmlformats.org/presentationml/2006/main">
+  <p:cSld>
+    <p:spTree>
+      <p:nvGrpSpPr>
+        <p:cNvPr id="1" name="Shape 169"/>
+        <p:cNvGrpSpPr/>
+        <p:nvPr/>
+      </p:nvGrpSpPr>
+      <p:grpSpPr>
+        <a:xfrm>
+          <a:off x="0" y="0"/>
+          <a:ext cx="0" cy="0"/>
+          <a:chOff x="0" y="0"/>
+          <a:chExt cx="0" cy="0"/>
+        </a:xfrm>
+      </p:grpSpPr>
+      <mc:AlternateContent xmlns:mc="http://schemas.openxmlformats.org/markup-compatibility/2006">
+        <mc:Choice xmlns:a14="http://schemas.microsoft.com/office/drawing/2010/main" Requires="a14">
+          <p:sp>
+            <p:nvSpPr>
+              <p:cNvPr id="170" name="Google Shape;170;p14"/>
+              <p:cNvSpPr txBox="1"/>
+              <p:nvPr/>
+            </p:nvSpPr>
+            <p:spPr>
+              <a:xfrm>
+                <a:off x="4572000" y="94475"/>
+                <a:ext cx="4523400" cy="4917085"/>
+              </a:xfrm>
+              <a:prstGeom prst="rect">
+                <a:avLst/>
+              </a:prstGeom>
+              <a:noFill/>
+              <a:ln>
+                <a:noFill/>
+              </a:ln>
+            </p:spPr>
+            <p:txBody>
+              <a:bodyPr spcFirstLastPara="1" wrap="square" lIns="91425" tIns="91425" rIns="91425" bIns="91425" anchor="t" anchorCtr="0">
+                <a:spAutoFit/>
+              </a:bodyPr>
+              <a:lstStyle/>
+              <a:p>
+                <a:pPr marL="457200" lvl="0" indent="-317500" algn="l" rtl="0">
+                  <a:spcBef>
+                    <a:spcPts val="0"/>
+                  </a:spcBef>
+                  <a:spcAft>
+                    <a:spcPts val="0"/>
+                  </a:spcAft>
+                  <a:buSzPts val="1400"/>
+                  <a:buChar char="●"/>
+                </a:pPr>
+                <a14:m>
+                  <m:oMath xmlns:m="http://schemas.openxmlformats.org/officeDocument/2006/math">
+                    <m:r>
+                      <a:rPr lang="it-IT" i="1" dirty="0" smtClean="0">
+                        <a:latin typeface="Cambria Math" panose="02040503050406030204" pitchFamily="18" charset="0"/>
+                      </a:rPr>
+                      <m:t>𝑆𝑜𝑓𝑡𝑤𝑎𝑟𝑒𝐻𝑜𝑢𝑠</m:t>
+                    </m:r>
+                    <m:sSub>
+                      <m:sSubPr>
+                        <m:ctrlPr>
+                          <a:rPr lang="it-IT" b="0" i="1" dirty="0" smtClean="0">
+                            <a:latin typeface="Cambria Math" panose="02040503050406030204" pitchFamily="18" charset="0"/>
+                          </a:rPr>
+                        </m:ctrlPr>
+                      </m:sSubPr>
+                      <m:e>
+                        <m:r>
+                          <a:rPr lang="it-IT" i="1" dirty="0" smtClean="0">
+                            <a:latin typeface="Cambria Math" panose="02040503050406030204" pitchFamily="18" charset="0"/>
+                          </a:rPr>
+                          <m:t>𝑒</m:t>
+                        </m:r>
+                      </m:e>
+                      <m:sub>
+                        <m:r>
+                          <a:rPr lang="it-IT" b="0" i="1" dirty="0" smtClean="0">
+                            <a:latin typeface="Cambria Math" panose="02040503050406030204" pitchFamily="18" charset="0"/>
+                          </a:rPr>
+                          <m:t>/2</m:t>
+                        </m:r>
+                      </m:sub>
+                    </m:sSub>
+                  </m:oMath>
+                </a14:m>
+                <a:endParaRPr lang="it-IT" dirty="0"/>
+              </a:p>
+              <a:p>
+                <a:pPr marL="0" lvl="0" indent="0" algn="l" rtl="0">
+                  <a:spcBef>
+                    <a:spcPts val="0"/>
+                  </a:spcBef>
+                  <a:spcAft>
+                    <a:spcPts val="0"/>
+                  </a:spcAft>
+                  <a:buNone/>
+                </a:pPr>
+                <a:endParaRPr lang="it-IT" dirty="0"/>
+              </a:p>
+              <a:p>
+                <a:pPr marL="457200" lvl="0" indent="-317500" algn="l" rtl="0">
+                  <a:spcBef>
+                    <a:spcPts val="0"/>
+                  </a:spcBef>
+                  <a:spcAft>
+                    <a:spcPts val="0"/>
+                  </a:spcAft>
+                  <a:buSzPts val="1400"/>
+                  <a:buChar char="●"/>
+                </a:pPr>
+                <a14:m>
+                  <m:oMath xmlns:m="http://schemas.openxmlformats.org/officeDocument/2006/math">
+                    <m:r>
+                      <a:rPr lang="it-IT" i="1" dirty="0" smtClean="0">
+                        <a:latin typeface="Cambria Math" panose="02040503050406030204" pitchFamily="18" charset="0"/>
+                      </a:rPr>
+                      <m:t>𝐶𝑖𝑡</m:t>
+                    </m:r>
+                    <m:sSub>
+                      <m:sSubPr>
+                        <m:ctrlPr>
+                          <a:rPr lang="it-IT" b="0" i="1" dirty="0" smtClean="0">
+                            <a:latin typeface="Cambria Math" panose="02040503050406030204" pitchFamily="18" charset="0"/>
+                          </a:rPr>
+                        </m:ctrlPr>
+                      </m:sSubPr>
+                      <m:e>
+                        <m:r>
+                          <a:rPr lang="it-IT" i="1" dirty="0" smtClean="0">
+                            <a:latin typeface="Cambria Math" panose="02040503050406030204" pitchFamily="18" charset="0"/>
+                          </a:rPr>
+                          <m:t>𝑦</m:t>
+                        </m:r>
+                      </m:e>
+                      <m:sub>
+                        <m:r>
+                          <a:rPr lang="it-IT" b="0" i="1" dirty="0" smtClean="0">
+                            <a:latin typeface="Cambria Math" panose="02040503050406030204" pitchFamily="18" charset="0"/>
+                          </a:rPr>
+                          <m:t>/1</m:t>
+                        </m:r>
+                      </m:sub>
+                    </m:sSub>
+                  </m:oMath>
+                </a14:m>
+                <a:endParaRPr lang="it-IT" u="sng" dirty="0"/>
+              </a:p>
+              <a:p>
+                <a:pPr marL="0" lvl="0" indent="0" algn="l" rtl="0">
+                  <a:spcBef>
+                    <a:spcPts val="0"/>
+                  </a:spcBef>
+                  <a:spcAft>
+                    <a:spcPts val="0"/>
+                  </a:spcAft>
+                  <a:buNone/>
+                </a:pPr>
+                <a:endParaRPr lang="it-IT" u="sng" dirty="0"/>
+              </a:p>
+              <a:p>
+                <a:pPr marL="457200" lvl="0" indent="-317500" algn="l" rtl="0">
+                  <a:spcBef>
+                    <a:spcPts val="0"/>
+                  </a:spcBef>
+                  <a:spcAft>
+                    <a:spcPts val="0"/>
+                  </a:spcAft>
+                  <a:buSzPts val="1400"/>
+                  <a:buChar char="●"/>
+                </a:pPr>
+                <a14:m>
+                  <m:oMath xmlns:m="http://schemas.openxmlformats.org/officeDocument/2006/math">
+                    <m:r>
+                      <a:rPr lang="it-IT" i="1" dirty="0" smtClean="0">
+                        <a:solidFill>
+                          <a:schemeClr val="dk1"/>
+                        </a:solidFill>
+                        <a:latin typeface="Cambria Math" panose="02040503050406030204" pitchFamily="18" charset="0"/>
+                      </a:rPr>
+                      <m:t>𝐿𝑜𝑐𝑎𝑡𝑒𝑑𝐼</m:t>
+                    </m:r>
+                    <m:sSub>
+                      <m:sSubPr>
+                        <m:ctrlPr>
+                          <a:rPr lang="it-IT" b="0" i="1" dirty="0" smtClean="0">
+                            <a:solidFill>
+                              <a:schemeClr val="dk1"/>
+                            </a:solidFill>
+                            <a:latin typeface="Cambria Math" panose="02040503050406030204" pitchFamily="18" charset="0"/>
+                          </a:rPr>
+                        </m:ctrlPr>
+                      </m:sSubPr>
+                      <m:e>
+                        <m:r>
+                          <a:rPr lang="it-IT" i="1" dirty="0" smtClean="0">
+                            <a:solidFill>
+                              <a:schemeClr val="dk1"/>
+                            </a:solidFill>
+                            <a:latin typeface="Cambria Math" panose="02040503050406030204" pitchFamily="18" charset="0"/>
+                          </a:rPr>
+                          <m:t>𝑛</m:t>
+                        </m:r>
+                      </m:e>
+                      <m:sub>
+                        <m:r>
+                          <a:rPr lang="it-IT" b="0" i="1" dirty="0" smtClean="0">
+                            <a:solidFill>
+                              <a:schemeClr val="dk1"/>
+                            </a:solidFill>
+                            <a:latin typeface="Cambria Math" panose="02040503050406030204" pitchFamily="18" charset="0"/>
+                          </a:rPr>
+                          <m:t>/4</m:t>
+                        </m:r>
+                      </m:sub>
+                    </m:sSub>
+                  </m:oMath>
+                </a14:m>
+                <a:endParaRPr lang="it-IT" dirty="0">
+                  <a:solidFill>
+                    <a:schemeClr val="dk1"/>
+                  </a:solidFill>
+                </a:endParaRPr>
+              </a:p>
+              <a:p>
+                <a:pPr marL="914400" lvl="1" indent="-292100" algn="l" rtl="0">
+                  <a:spcBef>
+                    <a:spcPts val="0"/>
+                  </a:spcBef>
+                  <a:spcAft>
+                    <a:spcPts val="0"/>
+                  </a:spcAft>
+                  <a:buClr>
+                    <a:schemeClr val="dk1"/>
+                  </a:buClr>
+                  <a:buSzPts val="1000"/>
+                  <a:buChar char="○"/>
+                </a:pPr>
+                <a:r>
+                  <a:rPr lang="it-IT" sz="1000" dirty="0">
+                    <a:solidFill>
+                      <a:schemeClr val="accent4">
+                        <a:lumMod val="75000"/>
+                      </a:schemeClr>
+                    </a:solidFill>
+                  </a:rPr>
+                  <a:t>LocatedIn(softwarehouse) → SoftwareHouse(name)</a:t>
+                </a:r>
+              </a:p>
+              <a:p>
+                <a:pPr marL="914400" lvl="1" indent="-292100" algn="l" rtl="0">
+                  <a:spcBef>
+                    <a:spcPts val="0"/>
+                  </a:spcBef>
+                  <a:spcAft>
+                    <a:spcPts val="0"/>
+                  </a:spcAft>
+                  <a:buClr>
+                    <a:schemeClr val="dk1"/>
+                  </a:buClr>
+                  <a:buSzPts val="1000"/>
+                  <a:buChar char="○"/>
+                </a:pPr>
+                <a:r>
+                  <a:rPr lang="it-IT" sz="1000" dirty="0">
+                    <a:solidFill>
+                      <a:schemeClr val="accent4">
+                        <a:lumMod val="75000"/>
+                      </a:schemeClr>
+                    </a:solidFill>
+                  </a:rPr>
+                  <a:t>LocatedIn(city) → City(name)</a:t>
+                </a:r>
+              </a:p>
+              <a:p>
+                <a:pPr marL="0" lvl="0" indent="0" algn="l" rtl="0">
+                  <a:spcBef>
+                    <a:spcPts val="0"/>
+                  </a:spcBef>
+                  <a:spcAft>
+                    <a:spcPts val="0"/>
+                  </a:spcAft>
+                  <a:buClr>
+                    <a:schemeClr val="dk1"/>
+                  </a:buClr>
+                  <a:buSzPts val="1100"/>
+                  <a:buFont typeface="Arial"/>
+                  <a:buNone/>
+                </a:pPr>
+                <a:endParaRPr lang="it-IT" u="sng" dirty="0">
+                  <a:solidFill>
+                    <a:schemeClr val="dk1"/>
+                  </a:solidFill>
+                </a:endParaRPr>
+              </a:p>
+              <a:p>
+                <a:pPr marL="457200" lvl="0" indent="-317500" algn="l" rtl="0">
+                  <a:spcBef>
+                    <a:spcPts val="0"/>
+                  </a:spcBef>
+                  <a:spcAft>
+                    <a:spcPts val="0"/>
+                  </a:spcAft>
+                  <a:buClr>
+                    <a:schemeClr val="dk1"/>
+                  </a:buClr>
+                  <a:buSzPts val="1400"/>
+                  <a:buChar char="●"/>
+                </a:pPr>
+                <a14:m>
+                  <m:oMath xmlns:m="http://schemas.openxmlformats.org/officeDocument/2006/math">
+                    <m:r>
+                      <a:rPr lang="it-IT" i="1" dirty="0" smtClean="0">
+                        <a:solidFill>
+                          <a:schemeClr val="dk1"/>
+                        </a:solidFill>
+                        <a:latin typeface="Cambria Math" panose="02040503050406030204" pitchFamily="18" charset="0"/>
+                      </a:rPr>
+                      <m:t>𝐶𝑜𝑢𝑛𝑡𝑟</m:t>
+                    </m:r>
+                    <m:sSub>
+                      <m:sSubPr>
+                        <m:ctrlPr>
+                          <a:rPr lang="it-IT" b="0" i="1" dirty="0" smtClean="0">
+                            <a:solidFill>
+                              <a:schemeClr val="dk1"/>
+                            </a:solidFill>
+                            <a:latin typeface="Cambria Math" panose="02040503050406030204" pitchFamily="18" charset="0"/>
+                          </a:rPr>
+                        </m:ctrlPr>
+                      </m:sSubPr>
+                      <m:e>
+                        <m:r>
+                          <a:rPr lang="it-IT" i="1" dirty="0" smtClean="0">
+                            <a:solidFill>
+                              <a:schemeClr val="dk1"/>
+                            </a:solidFill>
+                            <a:latin typeface="Cambria Math" panose="02040503050406030204" pitchFamily="18" charset="0"/>
+                          </a:rPr>
+                          <m:t>𝑦</m:t>
+                        </m:r>
+                      </m:e>
+                      <m:sub>
+                        <m:r>
+                          <a:rPr lang="it-IT" b="0" i="1" dirty="0" smtClean="0">
+                            <a:solidFill>
+                              <a:schemeClr val="dk1"/>
+                            </a:solidFill>
+                            <a:latin typeface="Cambria Math" panose="02040503050406030204" pitchFamily="18" charset="0"/>
+                          </a:rPr>
+                          <m:t>/1</m:t>
+                        </m:r>
+                      </m:sub>
+                    </m:sSub>
+                  </m:oMath>
+                </a14:m>
+                <a:endParaRPr lang="it-IT" u="sng" dirty="0">
+                  <a:solidFill>
+                    <a:schemeClr val="dk1"/>
+                  </a:solidFill>
+                </a:endParaRPr>
+              </a:p>
+              <a:p>
+                <a:pPr marL="457200" lvl="0" indent="0" algn="l" rtl="0">
+                  <a:spcBef>
+                    <a:spcPts val="0"/>
+                  </a:spcBef>
+                  <a:spcAft>
+                    <a:spcPts val="0"/>
+                  </a:spcAft>
+                  <a:buNone/>
+                </a:pPr>
+                <a:endParaRPr lang="it-IT" u="sng" dirty="0">
+                  <a:solidFill>
+                    <a:schemeClr val="dk1"/>
+                  </a:solidFill>
+                </a:endParaRPr>
+              </a:p>
+              <a:p>
+                <a:pPr marL="457200" lvl="0" indent="-317500" algn="l" rtl="0">
+                  <a:spcBef>
+                    <a:spcPts val="0"/>
+                  </a:spcBef>
+                  <a:spcAft>
+                    <a:spcPts val="0"/>
+                  </a:spcAft>
+                  <a:buClr>
+                    <a:schemeClr val="dk1"/>
+                  </a:buClr>
+                  <a:buSzPts val="1400"/>
+                  <a:buChar char="●"/>
+                </a:pPr>
+                <a14:m>
+                  <m:oMath xmlns:m="http://schemas.openxmlformats.org/officeDocument/2006/math">
+                    <m:r>
+                      <a:rPr lang="it-IT" i="1" dirty="0" smtClean="0">
+                        <a:solidFill>
+                          <a:schemeClr val="dk1"/>
+                        </a:solidFill>
+                        <a:latin typeface="Cambria Math" panose="02040503050406030204" pitchFamily="18" charset="0"/>
+                      </a:rPr>
+                      <m:t>𝐻𝑎𝑠𝐶𝑜𝑢𝑛𝑡𝑟</m:t>
+                    </m:r>
+                    <m:sSub>
+                      <m:sSubPr>
+                        <m:ctrlPr>
+                          <a:rPr lang="it-IT" b="0" i="1" dirty="0" smtClean="0">
+                            <a:solidFill>
+                              <a:schemeClr val="dk1"/>
+                            </a:solidFill>
+                            <a:latin typeface="Cambria Math" panose="02040503050406030204" pitchFamily="18" charset="0"/>
+                          </a:rPr>
+                        </m:ctrlPr>
+                      </m:sSubPr>
+                      <m:e>
+                        <m:r>
+                          <a:rPr lang="it-IT" i="1" dirty="0" smtClean="0">
+                            <a:solidFill>
+                              <a:schemeClr val="dk1"/>
+                            </a:solidFill>
+                            <a:latin typeface="Cambria Math" panose="02040503050406030204" pitchFamily="18" charset="0"/>
+                          </a:rPr>
+                          <m:t>𝑦</m:t>
+                        </m:r>
+                      </m:e>
+                      <m:sub>
+                        <m:r>
+                          <a:rPr lang="it-IT" b="0" i="1" dirty="0" smtClean="0">
+                            <a:solidFill>
+                              <a:schemeClr val="dk1"/>
+                            </a:solidFill>
+                            <a:latin typeface="Cambria Math" panose="02040503050406030204" pitchFamily="18" charset="0"/>
+                          </a:rPr>
+                          <m:t>/2</m:t>
+                        </m:r>
+                      </m:sub>
+                    </m:sSub>
+                  </m:oMath>
+                </a14:m>
+                <a:endParaRPr lang="it-IT" dirty="0">
+                  <a:solidFill>
+                    <a:schemeClr val="dk1"/>
+                  </a:solidFill>
+                </a:endParaRPr>
+              </a:p>
+              <a:p>
+                <a:pPr marL="914400" lvl="1" indent="-292100" algn="l" rtl="0">
+                  <a:spcBef>
+                    <a:spcPts val="0"/>
+                  </a:spcBef>
+                  <a:spcAft>
+                    <a:spcPts val="0"/>
+                  </a:spcAft>
+                  <a:buClr>
+                    <a:schemeClr val="dk1"/>
+                  </a:buClr>
+                  <a:buSzPts val="1000"/>
+                  <a:buChar char="○"/>
+                </a:pPr>
+                <a:r>
+                  <a:rPr lang="it-IT" sz="1000" dirty="0">
+                    <a:solidFill>
+                      <a:schemeClr val="accent4">
+                        <a:lumMod val="75000"/>
+                      </a:schemeClr>
+                    </a:solidFill>
+                  </a:rPr>
+                  <a:t>HasCountry(country) → Country(name)</a:t>
+                </a:r>
+              </a:p>
+              <a:p>
+                <a:pPr marL="914400" lvl="1" indent="-292100" algn="l" rtl="0">
+                  <a:spcBef>
+                    <a:spcPts val="0"/>
+                  </a:spcBef>
+                  <a:spcAft>
+                    <a:spcPts val="0"/>
+                  </a:spcAft>
+                  <a:buClr>
+                    <a:schemeClr val="dk1"/>
+                  </a:buClr>
+                  <a:buSzPts val="1000"/>
+                  <a:buChar char="○"/>
+                </a:pPr>
+                <a:r>
+                  <a:rPr lang="it-IT" sz="1000" dirty="0">
+                    <a:solidFill>
+                      <a:schemeClr val="accent4">
+                        <a:lumMod val="75000"/>
+                      </a:schemeClr>
+                    </a:solidFill>
+                  </a:rPr>
+                  <a:t>HasCountry(city) → City(name)</a:t>
+                </a:r>
+              </a:p>
+              <a:p>
+                <a:pPr marL="0" lvl="0" indent="0" algn="l" rtl="0">
+                  <a:spcBef>
+                    <a:spcPts val="0"/>
+                  </a:spcBef>
+                  <a:spcAft>
+                    <a:spcPts val="0"/>
+                  </a:spcAft>
+                  <a:buNone/>
+                </a:pPr>
+                <a:endParaRPr lang="it-IT" sz="1000" u="sng" dirty="0">
+                  <a:solidFill>
+                    <a:schemeClr val="dk1"/>
+                  </a:solidFill>
+                </a:endParaRPr>
+              </a:p>
+              <a:p>
+                <a:pPr marL="457200" lvl="0" indent="-317500" algn="l" rtl="0">
+                  <a:spcBef>
+                    <a:spcPts val="0"/>
+                  </a:spcBef>
+                  <a:spcAft>
+                    <a:spcPts val="0"/>
+                  </a:spcAft>
+                  <a:buClr>
+                    <a:schemeClr val="dk1"/>
+                  </a:buClr>
+                  <a:buSzPts val="1400"/>
+                  <a:buChar char="●"/>
+                </a:pPr>
+                <a14:m>
+                  <m:oMath xmlns:m="http://schemas.openxmlformats.org/officeDocument/2006/math">
+                    <m:r>
+                      <a:rPr lang="it-IT" i="1" dirty="0" smtClean="0">
+                        <a:solidFill>
+                          <a:schemeClr val="dk1"/>
+                        </a:solidFill>
+                        <a:latin typeface="Cambria Math" panose="02040503050406030204" pitchFamily="18" charset="0"/>
+                      </a:rPr>
+                      <m:t>𝑉𝑖𝑑𝑒𝑜𝑔𝑎𝑚</m:t>
+                    </m:r>
+                    <m:sSub>
+                      <m:sSubPr>
+                        <m:ctrlPr>
+                          <a:rPr lang="it-IT" b="0" i="1" dirty="0" smtClean="0">
+                            <a:solidFill>
+                              <a:schemeClr val="dk1"/>
+                            </a:solidFill>
+                            <a:latin typeface="Cambria Math" panose="02040503050406030204" pitchFamily="18" charset="0"/>
+                          </a:rPr>
+                        </m:ctrlPr>
+                      </m:sSubPr>
+                      <m:e>
+                        <m:r>
+                          <a:rPr lang="it-IT" i="1" dirty="0" smtClean="0">
+                            <a:solidFill>
+                              <a:schemeClr val="dk1"/>
+                            </a:solidFill>
+                            <a:latin typeface="Cambria Math" panose="02040503050406030204" pitchFamily="18" charset="0"/>
+                          </a:rPr>
+                          <m:t>𝑒</m:t>
+                        </m:r>
+                      </m:e>
+                      <m:sub>
+                        <m:r>
+                          <a:rPr lang="it-IT" b="0" i="1" dirty="0" smtClean="0">
+                            <a:solidFill>
+                              <a:schemeClr val="dk1"/>
+                            </a:solidFill>
+                            <a:latin typeface="Cambria Math" panose="02040503050406030204" pitchFamily="18" charset="0"/>
+                          </a:rPr>
+                          <m:t>/2</m:t>
+                        </m:r>
+                      </m:sub>
+                    </m:sSub>
+                  </m:oMath>
+                </a14:m>
+                <a:endParaRPr lang="it-IT" dirty="0">
+                  <a:solidFill>
+                    <a:schemeClr val="dk1"/>
+                  </a:solidFill>
+                </a:endParaRPr>
+              </a:p>
+              <a:p>
+                <a:pPr marL="0" lvl="0" indent="0" algn="l" rtl="0">
+                  <a:spcBef>
+                    <a:spcPts val="0"/>
+                  </a:spcBef>
+                  <a:spcAft>
+                    <a:spcPts val="0"/>
+                  </a:spcAft>
+                  <a:buNone/>
+                </a:pPr>
+                <a:endParaRPr lang="it-IT" dirty="0">
+                  <a:solidFill>
+                    <a:schemeClr val="dk1"/>
+                  </a:solidFill>
+                </a:endParaRPr>
+              </a:p>
+              <a:p>
+                <a:pPr marL="457200" lvl="0" indent="-317500" algn="l" rtl="0">
+                  <a:spcBef>
+                    <a:spcPts val="0"/>
+                  </a:spcBef>
+                  <a:spcAft>
+                    <a:spcPts val="0"/>
+                  </a:spcAft>
+                  <a:buClr>
+                    <a:schemeClr val="dk1"/>
+                  </a:buClr>
+                  <a:buSzPts val="1400"/>
+                  <a:buChar char="●"/>
+                </a:pPr>
+                <a14:m>
+                  <m:oMath xmlns:m="http://schemas.openxmlformats.org/officeDocument/2006/math">
+                    <m:r>
+                      <a:rPr lang="it-IT" i="1" dirty="0" smtClean="0">
+                        <a:solidFill>
+                          <a:schemeClr val="dk1"/>
+                        </a:solidFill>
+                        <a:latin typeface="Cambria Math" panose="02040503050406030204" pitchFamily="18" charset="0"/>
+                      </a:rPr>
+                      <m:t>𝐶𝑜𝑛𝑠𝑜𝑙</m:t>
+                    </m:r>
+                    <m:sSub>
+                      <m:sSubPr>
+                        <m:ctrlPr>
+                          <a:rPr lang="it-IT" b="0" i="1" dirty="0" smtClean="0">
+                            <a:solidFill>
+                              <a:schemeClr val="dk1"/>
+                            </a:solidFill>
+                            <a:latin typeface="Cambria Math" panose="02040503050406030204" pitchFamily="18" charset="0"/>
+                          </a:rPr>
+                        </m:ctrlPr>
+                      </m:sSubPr>
+                      <m:e>
+                        <m:r>
+                          <a:rPr lang="it-IT" i="1" dirty="0" smtClean="0">
+                            <a:solidFill>
+                              <a:schemeClr val="dk1"/>
+                            </a:solidFill>
+                            <a:latin typeface="Cambria Math" panose="02040503050406030204" pitchFamily="18" charset="0"/>
+                          </a:rPr>
+                          <m:t>𝑒</m:t>
+                        </m:r>
+                      </m:e>
+                      <m:sub>
+                        <m:r>
+                          <a:rPr lang="it-IT" b="0" i="1" dirty="0" smtClean="0">
+                            <a:solidFill>
+                              <a:schemeClr val="dk1"/>
+                            </a:solidFill>
+                            <a:latin typeface="Cambria Math" panose="02040503050406030204" pitchFamily="18" charset="0"/>
+                          </a:rPr>
+                          <m:t>/1</m:t>
+                        </m:r>
+                      </m:sub>
+                    </m:sSub>
+                  </m:oMath>
+                </a14:m>
+                <a:endParaRPr lang="it-IT" dirty="0">
+                  <a:solidFill>
+                    <a:schemeClr val="dk1"/>
+                  </a:solidFill>
+                </a:endParaRPr>
+              </a:p>
+              <a:p>
+                <a:pPr marL="0" lvl="0" indent="0" algn="l" rtl="0">
+                  <a:spcBef>
+                    <a:spcPts val="0"/>
+                  </a:spcBef>
+                  <a:spcAft>
+                    <a:spcPts val="0"/>
+                  </a:spcAft>
+                  <a:buNone/>
+                </a:pPr>
+                <a:endParaRPr lang="it-IT" dirty="0">
+                  <a:solidFill>
+                    <a:schemeClr val="dk1"/>
+                  </a:solidFill>
+                </a:endParaRPr>
+              </a:p>
+              <a:p>
+                <a:pPr marL="457200" lvl="0" indent="-317500" algn="l" rtl="0">
+                  <a:spcBef>
+                    <a:spcPts val="0"/>
+                  </a:spcBef>
+                  <a:spcAft>
+                    <a:spcPts val="0"/>
+                  </a:spcAft>
+                  <a:buClr>
+                    <a:schemeClr val="dk1"/>
+                  </a:buClr>
+                  <a:buSzPts val="1400"/>
+                  <a:buChar char="●"/>
+                </a:pPr>
+                <a14:m>
+                  <m:oMath xmlns:m="http://schemas.openxmlformats.org/officeDocument/2006/math">
+                    <m:r>
+                      <a:rPr lang="it-IT" i="1" dirty="0" smtClean="0">
+                        <a:solidFill>
+                          <a:schemeClr val="dk1"/>
+                        </a:solidFill>
+                        <a:latin typeface="Cambria Math" panose="02040503050406030204" pitchFamily="18" charset="0"/>
+                      </a:rPr>
+                      <m:t>𝑅𝑒𝑙𝑒𝑎𝑠𝑒𝑑𝐹𝑜</m:t>
+                    </m:r>
+                    <m:sSub>
+                      <m:sSubPr>
+                        <m:ctrlPr>
+                          <a:rPr lang="it-IT" b="0" i="1" dirty="0" smtClean="0">
+                            <a:solidFill>
+                              <a:schemeClr val="dk1"/>
+                            </a:solidFill>
+                            <a:latin typeface="Cambria Math" panose="02040503050406030204" pitchFamily="18" charset="0"/>
+                          </a:rPr>
+                        </m:ctrlPr>
+                      </m:sSubPr>
+                      <m:e>
+                        <m:r>
+                          <a:rPr lang="it-IT" i="1" dirty="0" smtClean="0">
+                            <a:solidFill>
+                              <a:schemeClr val="dk1"/>
+                            </a:solidFill>
+                            <a:latin typeface="Cambria Math" panose="02040503050406030204" pitchFamily="18" charset="0"/>
+                          </a:rPr>
+                          <m:t>𝑟</m:t>
+                        </m:r>
+                      </m:e>
+                      <m:sub>
+                        <m:r>
+                          <a:rPr lang="it-IT" b="0" i="1" dirty="0" smtClean="0">
+                            <a:solidFill>
+                              <a:schemeClr val="dk1"/>
+                            </a:solidFill>
+                            <a:latin typeface="Cambria Math" panose="02040503050406030204" pitchFamily="18" charset="0"/>
+                          </a:rPr>
+                          <m:t>/5</m:t>
+                        </m:r>
+                      </m:sub>
+                    </m:sSub>
+                  </m:oMath>
+                </a14:m>
+                <a:endParaRPr lang="it-IT" dirty="0">
+                  <a:solidFill>
+                    <a:schemeClr val="dk1"/>
+                  </a:solidFill>
+                </a:endParaRPr>
+              </a:p>
+              <a:p>
+                <a:pPr marL="914400" lvl="1" indent="-292100" algn="l" rtl="0">
+                  <a:spcBef>
+                    <a:spcPts val="0"/>
+                  </a:spcBef>
+                  <a:spcAft>
+                    <a:spcPts val="0"/>
+                  </a:spcAft>
+                  <a:buClr>
+                    <a:schemeClr val="dk1"/>
+                  </a:buClr>
+                  <a:buSzPts val="1000"/>
+                  <a:buChar char="○"/>
+                </a:pPr>
+                <a:r>
+                  <a:rPr lang="it-IT" sz="1000" dirty="0">
+                    <a:solidFill>
+                      <a:schemeClr val="accent4">
+                        <a:lumMod val="75000"/>
+                      </a:schemeClr>
+                    </a:solidFill>
+                  </a:rPr>
+                  <a:t>ReleasedFor(game) → Videogame(title)</a:t>
+                </a:r>
+              </a:p>
+              <a:p>
+                <a:pPr marL="914400" lvl="1" indent="-292100" algn="l" rtl="0">
+                  <a:spcBef>
+                    <a:spcPts val="0"/>
+                  </a:spcBef>
+                  <a:spcAft>
+                    <a:spcPts val="0"/>
+                  </a:spcAft>
+                  <a:buClr>
+                    <a:schemeClr val="dk1"/>
+                  </a:buClr>
+                  <a:buSzPts val="1000"/>
+                  <a:buChar char="○"/>
+                </a:pPr>
+                <a:r>
+                  <a:rPr lang="it-IT" sz="1000" dirty="0">
+                    <a:solidFill>
+                      <a:schemeClr val="accent4">
+                        <a:lumMod val="75000"/>
+                      </a:schemeClr>
+                    </a:solidFill>
+                  </a:rPr>
+                  <a:t>ReleasedFor(console) → Console(platform)</a:t>
+                </a:r>
+              </a:p>
+              <a:p>
+                <a:pPr marL="0" lvl="0" indent="0" algn="l" rtl="0">
+                  <a:spcBef>
+                    <a:spcPts val="0"/>
+                  </a:spcBef>
+                  <a:spcAft>
+                    <a:spcPts val="0"/>
+                  </a:spcAft>
+                  <a:buNone/>
+                </a:pPr>
+                <a:endParaRPr lang="it-IT" dirty="0">
+                  <a:solidFill>
+                    <a:schemeClr val="dk1"/>
+                  </a:solidFill>
+                </a:endParaRPr>
+              </a:p>
+              <a:p>
+                <a:pPr marL="0" lvl="0" indent="0" algn="l" rtl="0">
+                  <a:spcBef>
+                    <a:spcPts val="0"/>
+                  </a:spcBef>
+                  <a:spcAft>
+                    <a:spcPts val="0"/>
+                  </a:spcAft>
+                  <a:buNone/>
+                </a:pPr>
+                <a:endParaRPr lang="it-IT" sz="1000" u="sng" dirty="0">
+                  <a:solidFill>
+                    <a:schemeClr val="dk1"/>
+                  </a:solidFill>
+                </a:endParaRPr>
+              </a:p>
+              <a:p>
+                <a:pPr marL="0" lvl="0" indent="0" algn="l" rtl="0">
+                  <a:spcBef>
+                    <a:spcPts val="0"/>
+                  </a:spcBef>
+                  <a:spcAft>
+                    <a:spcPts val="0"/>
+                  </a:spcAft>
+                  <a:buNone/>
+                </a:pPr>
+                <a:endParaRPr sz="1000" u="sng" dirty="0">
+                  <a:solidFill>
+                    <a:schemeClr val="dk1"/>
+                  </a:solidFill>
+                </a:endParaRPr>
+              </a:p>
+            </p:txBody>
+          </p:sp>
+        </mc:Choice>
+        <mc:Fallback>
+          <p:sp>
+            <p:nvSpPr>
+              <p:cNvPr id="170" name="Google Shape;170;p14"/>
+              <p:cNvSpPr txBox="1">
+                <a:spLocks noRot="1" noChangeAspect="1" noMove="1" noResize="1" noEditPoints="1" noAdjustHandles="1" noChangeArrowheads="1" noChangeShapeType="1" noTextEdit="1"/>
+              </p:cNvSpPr>
+              <p:nvPr/>
+            </p:nvSpPr>
+            <p:spPr>
+              <a:xfrm>
+                <a:off x="4572000" y="94475"/>
+                <a:ext cx="4523400" cy="4917085"/>
+              </a:xfrm>
+              <a:prstGeom prst="rect">
+                <a:avLst/>
+              </a:prstGeom>
+              <a:blipFill>
+                <a:blip r:embed="rId3"/>
+                <a:stretch>
+                  <a:fillRect/>
+                </a:stretch>
+              </a:blipFill>
+              <a:ln>
+                <a:noFill/>
+              </a:ln>
+            </p:spPr>
+            <p:txBody>
+              <a:bodyPr/>
+              <a:lstStyle/>
+              <a:p>
+                <a:r>
+                  <a:rPr lang="en-US">
+                    <a:noFill/>
+                  </a:rPr>
+                  <a:t> </a:t>
+                </a:r>
+              </a:p>
+            </p:txBody>
+          </p:sp>
+        </mc:Fallback>
+      </mc:AlternateContent>
+      <p:sp>
+        <p:nvSpPr>
+          <p:cNvPr id="171" name="Google Shape;171;p14"/>
+          <p:cNvSpPr txBox="1"/>
+          <p:nvPr/>
+        </p:nvSpPr>
+        <p:spPr>
+          <a:xfrm>
+            <a:off x="7487900" y="2633750"/>
+            <a:ext cx="3401400" cy="396900"/>
+          </a:xfrm>
+          <a:prstGeom prst="rect">
+            <a:avLst/>
+          </a:prstGeom>
+          <a:noFill/>
+          <a:ln>
+            <a:noFill/>
+          </a:ln>
+        </p:spPr>
+        <p:txBody>
+          <a:bodyPr spcFirstLastPara="1" wrap="square" lIns="91425" tIns="91425" rIns="91425" bIns="91425" anchor="t" anchorCtr="0">
+            <a:spAutoFit/>
+          </a:bodyPr>
+          <a:lstStyle/>
+          <a:p>
+            <a:pPr marL="0" lvl="0" indent="0" algn="l" rtl="0">
+              <a:spcBef>
+                <a:spcPts val="0"/>
+              </a:spcBef>
+              <a:spcAft>
+                <a:spcPts val="0"/>
+              </a:spcAft>
+              <a:buNone/>
+            </a:pPr>
+            <a:endParaRPr/>
+          </a:p>
+        </p:txBody>
+      </p:sp>
+      <mc:AlternateContent xmlns:mc="http://schemas.openxmlformats.org/markup-compatibility/2006">
+        <mc:Choice xmlns:a14="http://schemas.microsoft.com/office/drawing/2010/main" Requires="a14">
+          <p:sp>
+            <p:nvSpPr>
+              <p:cNvPr id="172" name="Google Shape;172;p14"/>
+              <p:cNvSpPr txBox="1"/>
+              <p:nvPr/>
+            </p:nvSpPr>
+            <p:spPr>
+              <a:xfrm>
+                <a:off x="60400" y="976925"/>
+                <a:ext cx="5455200" cy="3716756"/>
+              </a:xfrm>
+              <a:prstGeom prst="rect">
+                <a:avLst/>
+              </a:prstGeom>
+              <a:noFill/>
+              <a:ln>
+                <a:noFill/>
+              </a:ln>
+            </p:spPr>
+            <p:txBody>
+              <a:bodyPr spcFirstLastPara="1" wrap="square" lIns="91425" tIns="91425" rIns="91425" bIns="91425" anchor="t" anchorCtr="0">
+                <a:spAutoFit/>
+              </a:bodyPr>
+              <a:lstStyle/>
+              <a:p>
+                <a:pPr marL="457200" lvl="0" indent="-317500" algn="l" rtl="0">
+                  <a:spcBef>
+                    <a:spcPts val="0"/>
+                  </a:spcBef>
+                  <a:spcAft>
+                    <a:spcPts val="0"/>
+                  </a:spcAft>
+                  <a:buSzPts val="1400"/>
+                  <a:buChar char="●"/>
+                </a:pPr>
+                <a14:m>
+                  <m:oMath xmlns:m="http://schemas.openxmlformats.org/officeDocument/2006/math">
+                    <m:r>
+                      <a:rPr lang="it-IT" i="1" dirty="0" smtClean="0">
+                        <a:latin typeface="Cambria Math" panose="02040503050406030204" pitchFamily="18" charset="0"/>
+                      </a:rPr>
+                      <m:t>𝐷𝑒𝑣𝑒𝑙𝑜𝑝𝑒</m:t>
+                    </m:r>
+                    <m:sSub>
+                      <m:sSubPr>
+                        <m:ctrlPr>
+                          <a:rPr lang="it-IT" b="0" i="1" dirty="0" smtClean="0">
+                            <a:latin typeface="Cambria Math" panose="02040503050406030204" pitchFamily="18" charset="0"/>
+                          </a:rPr>
+                        </m:ctrlPr>
+                      </m:sSubPr>
+                      <m:e>
+                        <m:r>
+                          <a:rPr lang="it-IT" i="1" dirty="0" smtClean="0">
+                            <a:latin typeface="Cambria Math" panose="02040503050406030204" pitchFamily="18" charset="0"/>
+                          </a:rPr>
+                          <m:t>𝑟</m:t>
+                        </m:r>
+                      </m:e>
+                      <m:sub>
+                        <m:r>
+                          <a:rPr lang="it-IT" b="0" i="1" dirty="0" smtClean="0">
+                            <a:latin typeface="Cambria Math" panose="02040503050406030204" pitchFamily="18" charset="0"/>
+                          </a:rPr>
+                          <m:t>/1</m:t>
+                        </m:r>
+                      </m:sub>
+                    </m:sSub>
+                  </m:oMath>
+                </a14:m>
+                <a:endParaRPr lang="it-IT" u="sng" dirty="0"/>
+              </a:p>
+              <a:p>
+                <a:pPr marL="914400" lvl="1" indent="-292100" algn="l" rtl="0">
+                  <a:spcBef>
+                    <a:spcPts val="0"/>
+                  </a:spcBef>
+                  <a:spcAft>
+                    <a:spcPts val="0"/>
+                  </a:spcAft>
+                  <a:buSzPts val="1000"/>
+                  <a:buChar char="○"/>
+                </a:pPr>
+                <a14:m>
+                  <m:oMath xmlns:m="http://schemas.openxmlformats.org/officeDocument/2006/math">
+                    <m:r>
+                      <a:rPr lang="it-IT" sz="1000" b="0" i="1" smtClean="0">
+                        <a:solidFill>
+                          <a:schemeClr val="dk1"/>
+                        </a:solidFill>
+                        <a:latin typeface="Cambria Math" panose="02040503050406030204" pitchFamily="18" charset="0"/>
+                      </a:rPr>
+                      <m:t>∀</m:t>
+                    </m:r>
+                    <m:r>
+                      <a:rPr lang="it-IT" sz="1000" b="0" i="1" smtClean="0">
+                        <a:solidFill>
+                          <a:schemeClr val="dk1"/>
+                        </a:solidFill>
+                        <a:latin typeface="Cambria Math" panose="02040503050406030204" pitchFamily="18" charset="0"/>
+                      </a:rPr>
+                      <m:t>𝑥</m:t>
+                    </m:r>
+                    <m:r>
+                      <a:rPr lang="it-IT" sz="1000" b="0" i="1" smtClean="0">
+                        <a:solidFill>
+                          <a:schemeClr val="dk1"/>
+                        </a:solidFill>
+                        <a:latin typeface="Cambria Math" panose="02040503050406030204" pitchFamily="18" charset="0"/>
+                      </a:rPr>
+                      <m:t>.</m:t>
+                    </m:r>
+                    <m:r>
+                      <a:rPr lang="it-IT" sz="1000" b="0" i="1" smtClean="0">
+                        <a:solidFill>
+                          <a:schemeClr val="dk1"/>
+                        </a:solidFill>
+                        <a:latin typeface="Cambria Math" panose="02040503050406030204" pitchFamily="18" charset="0"/>
+                      </a:rPr>
+                      <m:t>𝐷𝑒𝑣𝑒𝑙𝑜𝑝𝑒𝑟</m:t>
+                    </m:r>
+                    <m:d>
+                      <m:dPr>
+                        <m:ctrlPr>
+                          <a:rPr lang="it-IT" sz="1000" b="0" i="1" smtClean="0">
+                            <a:solidFill>
+                              <a:schemeClr val="dk1"/>
+                            </a:solidFill>
+                            <a:latin typeface="Cambria Math" panose="02040503050406030204" pitchFamily="18" charset="0"/>
+                          </a:rPr>
+                        </m:ctrlPr>
+                      </m:dPr>
+                      <m:e>
+                        <m:r>
+                          <a:rPr lang="it-IT" sz="1000" b="0" i="1" smtClean="0">
+                            <a:solidFill>
+                              <a:schemeClr val="dk1"/>
+                            </a:solidFill>
+                            <a:latin typeface="Cambria Math" panose="02040503050406030204" pitchFamily="18" charset="0"/>
+                          </a:rPr>
+                          <m:t>𝑥</m:t>
+                        </m:r>
+                      </m:e>
+                    </m:d>
+                    <m:r>
+                      <a:rPr lang="it-IT" sz="1000" b="0" i="1" smtClean="0">
+                        <a:solidFill>
+                          <a:schemeClr val="dk1"/>
+                        </a:solidFill>
+                        <a:latin typeface="Cambria Math" panose="02040503050406030204" pitchFamily="18" charset="0"/>
+                      </a:rPr>
+                      <m:t>→</m:t>
+                    </m:r>
+                    <m:r>
+                      <a:rPr lang="it-IT" sz="1000" b="0" i="1" smtClean="0">
+                        <a:solidFill>
+                          <a:schemeClr val="dk1"/>
+                        </a:solidFill>
+                        <a:latin typeface="Cambria Math" panose="02040503050406030204" pitchFamily="18" charset="0"/>
+                      </a:rPr>
+                      <m:t>𝑆𝑜𝑓𝑡𝑤𝑎𝑟𝑒𝐻𝑜𝑢𝑠𝑒</m:t>
+                    </m:r>
+                    <m:r>
+                      <a:rPr lang="it-IT" sz="1000" b="0" i="1" smtClean="0">
+                        <a:solidFill>
+                          <a:schemeClr val="dk1"/>
+                        </a:solidFill>
+                        <a:latin typeface="Cambria Math" panose="02040503050406030204" pitchFamily="18" charset="0"/>
+                      </a:rPr>
+                      <m:t>(</m:t>
+                    </m:r>
+                    <m:r>
+                      <a:rPr lang="it-IT" sz="1000" b="0" i="1" smtClean="0">
+                        <a:solidFill>
+                          <a:schemeClr val="dk1"/>
+                        </a:solidFill>
+                        <a:latin typeface="Cambria Math" panose="02040503050406030204" pitchFamily="18" charset="0"/>
+                      </a:rPr>
+                      <m:t>𝑥</m:t>
+                    </m:r>
+                    <m:r>
+                      <a:rPr lang="it-IT" sz="1000" b="0" i="1" smtClean="0">
+                        <a:solidFill>
+                          <a:schemeClr val="dk1"/>
+                        </a:solidFill>
+                        <a:latin typeface="Cambria Math" panose="02040503050406030204" pitchFamily="18" charset="0"/>
+                      </a:rPr>
+                      <m:t>)</m:t>
+                    </m:r>
+                  </m:oMath>
+                </a14:m>
+                <a:endParaRPr lang="it-IT" sz="1000" dirty="0">
+                  <a:solidFill>
+                    <a:schemeClr val="dk1"/>
+                  </a:solidFill>
+                </a:endParaRPr>
+              </a:p>
+              <a:p>
+                <a:pPr marL="457200" lvl="0" indent="0" algn="l" rtl="0">
+                  <a:spcBef>
+                    <a:spcPts val="0"/>
+                  </a:spcBef>
+                  <a:spcAft>
+                    <a:spcPts val="0"/>
+                  </a:spcAft>
+                  <a:buNone/>
+                </a:pPr>
+                <a:endParaRPr lang="it-IT" u="sng" dirty="0"/>
+              </a:p>
+              <a:p>
+                <a:pPr marL="457200" lvl="0" indent="-317500">
+                  <a:buClr>
+                    <a:schemeClr val="dk1"/>
+                  </a:buClr>
+                  <a:buSzPts val="1400"/>
+                  <a:buChar char="●"/>
+                </a:pPr>
+                <a14:m>
+                  <m:oMath xmlns:m="http://schemas.openxmlformats.org/officeDocument/2006/math">
+                    <m:r>
+                      <a:rPr lang="it-IT" b="0" i="1" dirty="0" smtClean="0">
+                        <a:solidFill>
+                          <a:schemeClr val="dk1"/>
+                        </a:solidFill>
+                        <a:latin typeface="Cambria Math" panose="02040503050406030204" pitchFamily="18" charset="0"/>
+                      </a:rPr>
+                      <m:t>𝑃𝑢𝑏𝑙𝑖𝑠h𝑒</m:t>
+                    </m:r>
+                    <m:sSub>
+                      <m:sSubPr>
+                        <m:ctrlPr>
+                          <a:rPr lang="it-IT" b="0" i="1" dirty="0" smtClean="0">
+                            <a:solidFill>
+                              <a:schemeClr val="dk1"/>
+                            </a:solidFill>
+                            <a:latin typeface="Cambria Math" panose="02040503050406030204" pitchFamily="18" charset="0"/>
+                          </a:rPr>
+                        </m:ctrlPr>
+                      </m:sSubPr>
+                      <m:e>
+                        <m:r>
+                          <a:rPr lang="it-IT" b="0" i="1" dirty="0" smtClean="0">
+                            <a:solidFill>
+                              <a:schemeClr val="dk1"/>
+                            </a:solidFill>
+                            <a:latin typeface="Cambria Math" panose="02040503050406030204" pitchFamily="18" charset="0"/>
+                          </a:rPr>
+                          <m:t>𝑟</m:t>
+                        </m:r>
+                      </m:e>
+                      <m:sub>
+                        <m:r>
+                          <a:rPr lang="it-IT" b="0" i="1" dirty="0" smtClean="0">
+                            <a:solidFill>
+                              <a:schemeClr val="dk1"/>
+                            </a:solidFill>
+                            <a:latin typeface="Cambria Math" panose="02040503050406030204" pitchFamily="18" charset="0"/>
+                          </a:rPr>
+                          <m:t>/1</m:t>
+                        </m:r>
+                      </m:sub>
+                    </m:sSub>
+                  </m:oMath>
+                </a14:m>
+                <a:endParaRPr lang="it-IT" u="sng" dirty="0">
+                  <a:solidFill>
+                    <a:schemeClr val="dk1"/>
+                  </a:solidFill>
+                </a:endParaRPr>
+              </a:p>
+              <a:p>
+                <a:pPr marL="914400" lvl="1" indent="-292100">
+                  <a:buClr>
+                    <a:schemeClr val="dk1"/>
+                  </a:buClr>
+                  <a:buSzPts val="1000"/>
+                  <a:buFont typeface="Arial"/>
+                  <a:buChar char="○"/>
+                </a:pPr>
+                <a:r>
+                  <a:rPr lang="it-IT" sz="1000" dirty="0">
+                    <a:solidFill>
+                      <a:schemeClr val="accent4">
+                        <a:lumMod val="75000"/>
+                      </a:schemeClr>
+                    </a:solidFill>
+                  </a:rPr>
+                  <a:t>Publisher(name) → SoftwareHouse(name)</a:t>
+                </a:r>
+              </a:p>
+              <a:p>
+                <a:pPr marL="0" lvl="0" indent="0" algn="l" rtl="0">
+                  <a:spcBef>
+                    <a:spcPts val="0"/>
+                  </a:spcBef>
+                  <a:spcAft>
+                    <a:spcPts val="0"/>
+                  </a:spcAft>
+                  <a:buNone/>
+                </a:pPr>
+                <a:endParaRPr lang="it-IT" dirty="0"/>
+              </a:p>
+              <a:p>
+                <a:pPr marL="457200" lvl="0" indent="-317500" algn="l" rtl="0">
+                  <a:spcBef>
+                    <a:spcPts val="0"/>
+                  </a:spcBef>
+                  <a:spcAft>
+                    <a:spcPts val="0"/>
+                  </a:spcAft>
+                  <a:buClr>
+                    <a:schemeClr val="dk1"/>
+                  </a:buClr>
+                  <a:buSzPts val="1400"/>
+                  <a:buChar char="●"/>
+                </a:pPr>
+                <a14:m>
+                  <m:oMath xmlns:m="http://schemas.openxmlformats.org/officeDocument/2006/math">
+                    <m:r>
+                      <a:rPr lang="it-IT" i="1" dirty="0" smtClean="0">
+                        <a:solidFill>
+                          <a:schemeClr val="dk1"/>
+                        </a:solidFill>
+                        <a:latin typeface="Cambria Math" panose="02040503050406030204" pitchFamily="18" charset="0"/>
+                      </a:rPr>
+                      <m:t>𝑃𝑢𝑏𝑙𝑖𝑠</m:t>
+                    </m:r>
+                    <m:sSub>
+                      <m:sSubPr>
+                        <m:ctrlPr>
+                          <a:rPr lang="it-IT" b="0" i="1" dirty="0" smtClean="0">
+                            <a:solidFill>
+                              <a:schemeClr val="dk1"/>
+                            </a:solidFill>
+                            <a:latin typeface="Cambria Math" panose="02040503050406030204" pitchFamily="18" charset="0"/>
+                          </a:rPr>
+                        </m:ctrlPr>
+                      </m:sSubPr>
+                      <m:e>
+                        <m:r>
+                          <a:rPr lang="it-IT" i="1" dirty="0" smtClean="0">
+                            <a:solidFill>
+                              <a:schemeClr val="dk1"/>
+                            </a:solidFill>
+                            <a:latin typeface="Cambria Math" panose="02040503050406030204" pitchFamily="18" charset="0"/>
+                          </a:rPr>
+                          <m:t>h</m:t>
+                        </m:r>
+                      </m:e>
+                      <m:sub>
+                        <m:r>
+                          <a:rPr lang="it-IT" b="0" i="1" dirty="0" smtClean="0">
+                            <a:solidFill>
+                              <a:schemeClr val="dk1"/>
+                            </a:solidFill>
+                            <a:latin typeface="Cambria Math" panose="02040503050406030204" pitchFamily="18" charset="0"/>
+                          </a:rPr>
+                          <m:t>/2</m:t>
+                        </m:r>
+                      </m:sub>
+                    </m:sSub>
+                  </m:oMath>
+                </a14:m>
+                <a:endParaRPr lang="it-IT" u="sng" dirty="0">
+                  <a:solidFill>
+                    <a:schemeClr val="dk1"/>
+                  </a:solidFill>
+                </a:endParaRPr>
+              </a:p>
+              <a:p>
+                <a:pPr marL="914400" lvl="1" indent="-292100">
+                  <a:buClr>
+                    <a:schemeClr val="dk1"/>
+                  </a:buClr>
+                  <a:buSzPts val="1000"/>
+                  <a:buFont typeface="Arial"/>
+                  <a:buChar char="○"/>
+                </a:pPr>
+                <a:r>
+                  <a:rPr lang="it-IT" sz="1000" dirty="0">
+                    <a:solidFill>
+                      <a:schemeClr val="accent4">
+                        <a:lumMod val="75000"/>
+                      </a:schemeClr>
+                    </a:solidFill>
+                  </a:rPr>
+                  <a:t>Publish(publisher) → Publisher(name)</a:t>
+                </a:r>
+              </a:p>
+              <a:p>
+                <a:pPr marL="914400" lvl="1" indent="-292100">
+                  <a:buClr>
+                    <a:schemeClr val="dk1"/>
+                  </a:buClr>
+                  <a:buSzPts val="1000"/>
+                  <a:buFont typeface="Arial"/>
+                  <a:buChar char="○"/>
+                </a:pPr>
+                <a:r>
+                  <a:rPr lang="it-IT" sz="1000" dirty="0">
+                    <a:solidFill>
+                      <a:schemeClr val="accent4">
+                        <a:lumMod val="75000"/>
+                      </a:schemeClr>
+                    </a:solidFill>
+                  </a:rPr>
+                  <a:t>Publish(game) → Videogame(title)</a:t>
+                </a:r>
+              </a:p>
+              <a:p>
+                <a:pPr marL="0" lvl="0" indent="0" algn="l" rtl="0">
+                  <a:spcBef>
+                    <a:spcPts val="0"/>
+                  </a:spcBef>
+                  <a:spcAft>
+                    <a:spcPts val="0"/>
+                  </a:spcAft>
+                  <a:buNone/>
+                </a:pPr>
+                <a:endParaRPr lang="it-IT" sz="1000" dirty="0">
+                  <a:solidFill>
+                    <a:schemeClr val="dk1"/>
+                  </a:solidFill>
+                </a:endParaRPr>
+              </a:p>
+              <a:p>
+                <a:pPr marL="457200" lvl="0" indent="-317500" algn="l" rtl="0">
+                  <a:spcBef>
+                    <a:spcPts val="0"/>
+                  </a:spcBef>
+                  <a:spcAft>
+                    <a:spcPts val="0"/>
+                  </a:spcAft>
+                  <a:buClr>
+                    <a:schemeClr val="dk1"/>
+                  </a:buClr>
+                  <a:buSzPts val="1400"/>
+                  <a:buChar char="●"/>
+                </a:pPr>
+                <a14:m>
+                  <m:oMath xmlns:m="http://schemas.openxmlformats.org/officeDocument/2006/math">
+                    <m:r>
+                      <a:rPr lang="it-IT" i="1" dirty="0" smtClean="0">
+                        <a:solidFill>
+                          <a:schemeClr val="dk1"/>
+                        </a:solidFill>
+                        <a:latin typeface="Cambria Math" panose="02040503050406030204" pitchFamily="18" charset="0"/>
+                      </a:rPr>
+                      <m:t>𝐷𝑒𝑣𝑒𝑙𝑜</m:t>
+                    </m:r>
+                    <m:sSub>
+                      <m:sSubPr>
+                        <m:ctrlPr>
+                          <a:rPr lang="it-IT" b="0" i="1" dirty="0" smtClean="0">
+                            <a:solidFill>
+                              <a:schemeClr val="dk1"/>
+                            </a:solidFill>
+                            <a:latin typeface="Cambria Math" panose="02040503050406030204" pitchFamily="18" charset="0"/>
+                          </a:rPr>
+                        </m:ctrlPr>
+                      </m:sSubPr>
+                      <m:e>
+                        <m:r>
+                          <a:rPr lang="it-IT" i="1" dirty="0" smtClean="0">
+                            <a:solidFill>
+                              <a:schemeClr val="dk1"/>
+                            </a:solidFill>
+                            <a:latin typeface="Cambria Math" panose="02040503050406030204" pitchFamily="18" charset="0"/>
+                          </a:rPr>
+                          <m:t>𝑝</m:t>
+                        </m:r>
+                      </m:e>
+                      <m:sub>
+                        <m:r>
+                          <a:rPr lang="it-IT" b="0" i="1" dirty="0" smtClean="0">
+                            <a:solidFill>
+                              <a:schemeClr val="dk1"/>
+                            </a:solidFill>
+                            <a:latin typeface="Cambria Math" panose="02040503050406030204" pitchFamily="18" charset="0"/>
+                          </a:rPr>
+                          <m:t>/2</m:t>
+                        </m:r>
+                      </m:sub>
+                    </m:sSub>
+                  </m:oMath>
+                </a14:m>
+                <a:r>
+                  <a:rPr lang="it-IT" u="sng" dirty="0">
+                    <a:solidFill>
+                      <a:schemeClr val="dk1"/>
+                    </a:solidFill>
+                  </a:rPr>
+                  <a:t> </a:t>
+                </a:r>
+              </a:p>
+              <a:p>
+                <a:pPr marL="914400" lvl="1" indent="-292100" algn="l" rtl="0">
+                  <a:spcBef>
+                    <a:spcPts val="0"/>
+                  </a:spcBef>
+                  <a:spcAft>
+                    <a:spcPts val="0"/>
+                  </a:spcAft>
+                  <a:buClr>
+                    <a:schemeClr val="dk1"/>
+                  </a:buClr>
+                  <a:buSzPts val="1000"/>
+                  <a:buChar char="○"/>
+                </a:pPr>
+                <a:r>
+                  <a:rPr lang="it-IT" sz="1000" dirty="0">
+                    <a:solidFill>
+                      <a:schemeClr val="accent4">
+                        <a:lumMod val="75000"/>
+                      </a:schemeClr>
+                    </a:solidFill>
+                  </a:rPr>
+                  <a:t>Develop(developer) → Developer(name)</a:t>
+                </a:r>
+              </a:p>
+              <a:p>
+                <a:pPr marL="914400" lvl="1" indent="-292100" algn="l" rtl="0">
+                  <a:spcBef>
+                    <a:spcPts val="0"/>
+                  </a:spcBef>
+                  <a:spcAft>
+                    <a:spcPts val="0"/>
+                  </a:spcAft>
+                  <a:buClr>
+                    <a:schemeClr val="dk1"/>
+                  </a:buClr>
+                  <a:buSzPts val="1000"/>
+                  <a:buChar char="○"/>
+                </a:pPr>
+                <a:r>
+                  <a:rPr lang="it-IT" sz="1000" dirty="0">
+                    <a:solidFill>
+                      <a:schemeClr val="accent4">
+                        <a:lumMod val="75000"/>
+                      </a:schemeClr>
+                    </a:solidFill>
+                  </a:rPr>
+                  <a:t>Develop(game) → Videogame(title)</a:t>
+                </a:r>
+              </a:p>
+              <a:p>
+                <a:pPr marL="0" lvl="0" indent="0" algn="l" rtl="0">
+                  <a:spcBef>
+                    <a:spcPts val="0"/>
+                  </a:spcBef>
+                  <a:spcAft>
+                    <a:spcPts val="0"/>
+                  </a:spcAft>
+                  <a:buNone/>
+                </a:pPr>
+                <a:endParaRPr lang="it-IT" sz="1000" dirty="0">
+                  <a:solidFill>
+                    <a:schemeClr val="dk1"/>
+                  </a:solidFill>
+                </a:endParaRPr>
+              </a:p>
+              <a:p>
+                <a:pPr marL="457200" lvl="0" indent="-317500" algn="l" rtl="0">
+                  <a:spcBef>
+                    <a:spcPts val="0"/>
+                  </a:spcBef>
+                  <a:spcAft>
+                    <a:spcPts val="0"/>
+                  </a:spcAft>
+                  <a:buClr>
+                    <a:schemeClr val="dk1"/>
+                  </a:buClr>
+                  <a:buSzPts val="1400"/>
+                  <a:buChar char="●"/>
+                </a:pPr>
+                <a14:m>
+                  <m:oMath xmlns:m="http://schemas.openxmlformats.org/officeDocument/2006/math">
+                    <m:r>
+                      <a:rPr lang="it-IT" i="1" dirty="0" smtClean="0">
+                        <a:solidFill>
+                          <a:schemeClr val="dk1"/>
+                        </a:solidFill>
+                        <a:latin typeface="Cambria Math" panose="02040503050406030204" pitchFamily="18" charset="0"/>
+                      </a:rPr>
+                      <m:t>𝑒𝑆𝑝𝑜𝑟</m:t>
+                    </m:r>
+                    <m:sSub>
+                      <m:sSubPr>
+                        <m:ctrlPr>
+                          <a:rPr lang="it-IT" b="0" i="1" dirty="0" smtClean="0">
+                            <a:solidFill>
+                              <a:schemeClr val="dk1"/>
+                            </a:solidFill>
+                            <a:latin typeface="Cambria Math" panose="02040503050406030204" pitchFamily="18" charset="0"/>
+                          </a:rPr>
+                        </m:ctrlPr>
+                      </m:sSubPr>
+                      <m:e>
+                        <m:r>
+                          <a:rPr lang="it-IT" i="1" dirty="0" smtClean="0">
+                            <a:solidFill>
+                              <a:schemeClr val="dk1"/>
+                            </a:solidFill>
+                            <a:latin typeface="Cambria Math" panose="02040503050406030204" pitchFamily="18" charset="0"/>
+                          </a:rPr>
+                          <m:t>𝑡</m:t>
+                        </m:r>
+                      </m:e>
+                      <m:sub>
+                        <m:r>
+                          <a:rPr lang="it-IT" b="0" i="1" dirty="0" smtClean="0">
+                            <a:solidFill>
+                              <a:schemeClr val="dk1"/>
+                            </a:solidFill>
+                            <a:latin typeface="Cambria Math" panose="02040503050406030204" pitchFamily="18" charset="0"/>
+                          </a:rPr>
+                          <m:t>/3</m:t>
+                        </m:r>
+                      </m:sub>
+                    </m:sSub>
+                  </m:oMath>
+                </a14:m>
+                <a:endParaRPr lang="it-IT" dirty="0">
+                  <a:solidFill>
+                    <a:schemeClr val="dk1"/>
+                  </a:solidFill>
+                </a:endParaRPr>
+              </a:p>
+              <a:p>
+                <a:pPr marL="914400" lvl="1" indent="-292100" algn="l" rtl="0">
+                  <a:spcBef>
+                    <a:spcPts val="0"/>
+                  </a:spcBef>
+                  <a:spcAft>
+                    <a:spcPts val="0"/>
+                  </a:spcAft>
+                  <a:buClr>
+                    <a:schemeClr val="dk1"/>
+                  </a:buClr>
+                  <a:buSzPts val="1000"/>
+                  <a:buChar char="○"/>
+                </a:pPr>
+                <a:r>
+                  <a:rPr lang="it-IT" sz="1000" dirty="0" err="1">
+                    <a:solidFill>
+                      <a:schemeClr val="accent4">
+                        <a:lumMod val="75000"/>
+                      </a:schemeClr>
+                    </a:solidFill>
+                  </a:rPr>
+                  <a:t>eSport</a:t>
+                </a:r>
+                <a:r>
+                  <a:rPr lang="it-IT" sz="1000" dirty="0">
+                    <a:solidFill>
+                      <a:schemeClr val="accent4">
+                        <a:lumMod val="75000"/>
+                      </a:schemeClr>
+                    </a:solidFill>
+                  </a:rPr>
+                  <a:t>(</a:t>
+                </a:r>
+                <a:r>
+                  <a:rPr lang="it-IT" sz="1000" dirty="0" err="1">
+                    <a:solidFill>
+                      <a:schemeClr val="accent4">
+                        <a:lumMod val="75000"/>
+                      </a:schemeClr>
+                    </a:solidFill>
+                  </a:rPr>
+                  <a:t>title</a:t>
+                </a:r>
+                <a:r>
+                  <a:rPr lang="it-IT" sz="1000" dirty="0">
+                    <a:solidFill>
+                      <a:schemeClr val="accent4">
+                        <a:lumMod val="75000"/>
+                      </a:schemeClr>
+                    </a:solidFill>
+                  </a:rPr>
+                  <a:t>) → Videogame(</a:t>
+                </a:r>
+                <a:r>
+                  <a:rPr lang="it-IT" sz="1000" dirty="0" err="1">
+                    <a:solidFill>
+                      <a:schemeClr val="accent4">
+                        <a:lumMod val="75000"/>
+                      </a:schemeClr>
+                    </a:solidFill>
+                  </a:rPr>
+                  <a:t>title</a:t>
+                </a:r>
+                <a:r>
+                  <a:rPr lang="it-IT" sz="1000" dirty="0">
+                    <a:solidFill>
+                      <a:schemeClr val="accent4">
+                        <a:lumMod val="75000"/>
+                      </a:schemeClr>
+                    </a:solidFill>
+                  </a:rPr>
+                  <a:t>)</a:t>
+                </a:r>
+              </a:p>
+              <a:p>
+                <a:pPr marL="0" lvl="0" indent="0" algn="l" rtl="0">
+                  <a:spcBef>
+                    <a:spcPts val="0"/>
+                  </a:spcBef>
+                  <a:spcAft>
+                    <a:spcPts val="0"/>
+                  </a:spcAft>
+                  <a:buNone/>
+                </a:pPr>
+                <a:endParaRPr lang="it-IT" sz="1000" dirty="0">
+                  <a:solidFill>
+                    <a:schemeClr val="dk1"/>
+                  </a:solidFill>
+                </a:endParaRPr>
+              </a:p>
+              <a:p>
+                <a:pPr marL="457200" lvl="0" indent="-317500" algn="l" rtl="0">
+                  <a:spcBef>
+                    <a:spcPts val="0"/>
+                  </a:spcBef>
+                  <a:spcAft>
+                    <a:spcPts val="0"/>
+                  </a:spcAft>
+                  <a:buClr>
+                    <a:schemeClr val="dk1"/>
+                  </a:buClr>
+                  <a:buSzPts val="1400"/>
+                  <a:buChar char="●"/>
+                </a:pPr>
+                <a14:m>
+                  <m:oMath xmlns:m="http://schemas.openxmlformats.org/officeDocument/2006/math">
+                    <m:r>
+                      <a:rPr lang="it-IT" i="1" dirty="0" smtClean="0">
+                        <a:solidFill>
+                          <a:schemeClr val="dk1"/>
+                        </a:solidFill>
+                        <a:latin typeface="Cambria Math" panose="02040503050406030204" pitchFamily="18" charset="0"/>
+                      </a:rPr>
+                      <m:t>𝑇𝑜𝑢𝑟𝑛𝑎𝑚𝑒𝑛</m:t>
+                    </m:r>
+                    <m:sSub>
+                      <m:sSubPr>
+                        <m:ctrlPr>
+                          <a:rPr lang="it-IT" b="0" i="1" dirty="0" smtClean="0">
+                            <a:solidFill>
+                              <a:schemeClr val="dk1"/>
+                            </a:solidFill>
+                            <a:latin typeface="Cambria Math" panose="02040503050406030204" pitchFamily="18" charset="0"/>
+                          </a:rPr>
+                        </m:ctrlPr>
+                      </m:sSubPr>
+                      <m:e>
+                        <m:r>
+                          <a:rPr lang="it-IT" i="1" dirty="0" smtClean="0">
+                            <a:solidFill>
+                              <a:schemeClr val="dk1"/>
+                            </a:solidFill>
+                            <a:latin typeface="Cambria Math" panose="02040503050406030204" pitchFamily="18" charset="0"/>
+                          </a:rPr>
+                          <m:t>𝑡</m:t>
+                        </m:r>
+                      </m:e>
+                      <m:sub>
+                        <m:r>
+                          <a:rPr lang="it-IT" b="0" i="1" dirty="0" smtClean="0">
+                            <a:solidFill>
+                              <a:schemeClr val="dk1"/>
+                            </a:solidFill>
+                            <a:latin typeface="Cambria Math" panose="02040503050406030204" pitchFamily="18" charset="0"/>
+                          </a:rPr>
+                          <m:t>/5</m:t>
+                        </m:r>
+                      </m:sub>
+                    </m:sSub>
+                  </m:oMath>
+                </a14:m>
+                <a:endParaRPr lang="it-IT" dirty="0">
+                  <a:solidFill>
+                    <a:schemeClr val="dk1"/>
+                  </a:solidFill>
+                </a:endParaRPr>
+              </a:p>
+              <a:p>
+                <a:pPr marL="914400" lvl="1" indent="-292100" algn="l" rtl="0">
+                  <a:spcBef>
+                    <a:spcPts val="0"/>
+                  </a:spcBef>
+                  <a:spcAft>
+                    <a:spcPts val="0"/>
+                  </a:spcAft>
+                  <a:buClr>
+                    <a:schemeClr val="dk1"/>
+                  </a:buClr>
+                  <a:buSzPts val="1000"/>
+                  <a:buChar char="○"/>
+                </a:pPr>
+                <a:r>
+                  <a:rPr lang="it-IT" sz="1000" dirty="0">
+                    <a:solidFill>
+                      <a:schemeClr val="accent4">
+                        <a:lumMod val="75000"/>
+                      </a:schemeClr>
+                    </a:solidFill>
+                  </a:rPr>
+                  <a:t>Tournament(game) → eSport(title)</a:t>
+                </a:r>
+                <a:endParaRPr sz="1000" dirty="0">
+                  <a:solidFill>
+                    <a:schemeClr val="accent4">
+                      <a:lumMod val="75000"/>
+                    </a:schemeClr>
+                  </a:solidFill>
+                </a:endParaRPr>
+              </a:p>
+            </p:txBody>
+          </p:sp>
+        </mc:Choice>
+        <mc:Fallback>
+          <p:sp>
+            <p:nvSpPr>
+              <p:cNvPr id="172" name="Google Shape;172;p14"/>
+              <p:cNvSpPr txBox="1">
+                <a:spLocks noRot="1" noChangeAspect="1" noMove="1" noResize="1" noEditPoints="1" noAdjustHandles="1" noChangeArrowheads="1" noChangeShapeType="1" noTextEdit="1"/>
+              </p:cNvSpPr>
+              <p:nvPr/>
+            </p:nvSpPr>
+            <p:spPr>
+              <a:xfrm>
+                <a:off x="60400" y="976925"/>
+                <a:ext cx="5455200" cy="3716756"/>
+              </a:xfrm>
+              <a:prstGeom prst="rect">
+                <a:avLst/>
+              </a:prstGeom>
+              <a:blipFill>
+                <a:blip r:embed="rId4"/>
+                <a:stretch>
+                  <a:fillRect/>
+                </a:stretch>
+              </a:blipFill>
+              <a:ln>
+                <a:noFill/>
+              </a:ln>
+            </p:spPr>
+            <p:txBody>
+              <a:bodyPr/>
+              <a:lstStyle/>
+              <a:p>
+                <a:r>
+                  <a:rPr lang="en-US">
+                    <a:noFill/>
+                  </a:rPr>
+                  <a:t> </a:t>
+                </a:r>
+              </a:p>
+            </p:txBody>
+          </p:sp>
+        </mc:Fallback>
+      </mc:AlternateContent>
+      <p:sp>
+        <p:nvSpPr>
+          <p:cNvPr id="173" name="Google Shape;173;p14"/>
+          <p:cNvSpPr txBox="1"/>
+          <p:nvPr/>
+        </p:nvSpPr>
+        <p:spPr>
+          <a:xfrm>
+            <a:off x="236200" y="194875"/>
+            <a:ext cx="3885600" cy="554100"/>
+          </a:xfrm>
+          <a:prstGeom prst="rect">
+            <a:avLst/>
+          </a:prstGeom>
+          <a:noFill/>
+          <a:ln>
+            <a:noFill/>
+          </a:ln>
+        </p:spPr>
+        <p:txBody>
+          <a:bodyPr spcFirstLastPara="1" wrap="square" lIns="91425" tIns="91425" rIns="91425" bIns="91425" anchor="t" anchorCtr="0">
+            <a:spAutoFit/>
+          </a:bodyPr>
+          <a:lstStyle/>
+          <a:p>
+            <a:pPr marL="0" lvl="0" indent="0" algn="l" rtl="0">
+              <a:spcBef>
+                <a:spcPts val="0"/>
+              </a:spcBef>
+              <a:spcAft>
+                <a:spcPts val="0"/>
+              </a:spcAft>
+              <a:buNone/>
+            </a:pPr>
+            <a:r>
+              <a:rPr lang="it" sz="2400" b="1" dirty="0">
+                <a:solidFill>
+                  <a:srgbClr val="45818E"/>
+                </a:solidFill>
+              </a:rPr>
+              <a:t>Global Schema</a:t>
+            </a:r>
+            <a:endParaRPr sz="2400" b="1" dirty="0">
+              <a:solidFill>
+                <a:srgbClr val="45818E"/>
+              </a:solidFill>
+            </a:endParaRPr>
+          </a:p>
+        </p:txBody>
+      </p:sp>
+    </p:spTree>
+    <p:extLst>
+      <p:ext uri="{BB962C8B-B14F-4D97-AF65-F5344CB8AC3E}">
+        <p14:creationId xmlns:p14="http://schemas.microsoft.com/office/powerpoint/2010/main" val="932296138"/>
+      </p:ext>
+    </p:extLst>
+  </p:cSld>
+  <p:clrMapOvr>
+    <a:masterClrMapping/>
+  </p:clrMapOvr>
+</p:sld>
+</file>
+
 <file path=ppt/theme/theme1.xml><?xml version="1.0" encoding="utf-8"?>
 <a:theme xmlns:a="http://schemas.openxmlformats.org/drawingml/2006/main" name="Simple Light">
   <a:themeElements>

</xml_diff>